<commit_message>
Presentation updated with comments
</commit_message>
<xml_diff>
--- a/presentations/Presentation2.pptx
+++ b/presentations/Presentation2.pptx
@@ -3058,7 +3058,9 @@
         <a:blipFill rotWithShape="1">
           <a:blip r:embed="rId2"/>
           <a:srcRect l="0" t="0" r="0" b="0"/>
-          <a:tile tx="0" ty="0" sx="100000" sy="100000" flip="none" algn="tl"/>
+          <a:stretch>
+            <a:fillRect/>
+          </a:stretch>
         </a:blipFill>
       </p:bgPr>
     </p:bg>
@@ -5186,6 +5188,78 @@
           </a:ln>
         </p:spPr>
       </p:pic>
+      <p:sp>
+        <p:nvSpPr>
+          <p:cNvPr id="159" name="10"/>
+          <p:cNvSpPr txBox="1"/>
+          <p:nvPr/>
+        </p:nvSpPr>
+        <p:spPr>
+          <a:xfrm>
+            <a:off x="3456381" y="8356600"/>
+            <a:ext cx="453238" cy="461059"/>
+          </a:xfrm>
+          <a:prstGeom prst="rect">
+            <a:avLst/>
+          </a:prstGeom>
+          <a:ln w="12700">
+            <a:miter lim="400000"/>
+          </a:ln>
+          <a:extLst>
+            <a:ext uri="{C572A759-6A51-4108-AA02-DFA0A04FC94B}">
+              <ma14:wrappingTextBoxFlag xmlns:ma14="http://schemas.microsoft.com/office/mac/drawingml/2011/main" val="1"/>
+            </a:ext>
+          </a:extLst>
+        </p:spPr>
+        <p:txBody>
+          <a:bodyPr wrap="none" lIns="50800" tIns="50800" rIns="50800" bIns="50800" anchor="ctr">
+            <a:spAutoFit/>
+          </a:bodyPr>
+          <a:lstStyle/>
+          <a:p>
+            <a:pPr/>
+            <a:r>
+              <a:t>10</a:t>
+            </a:r>
+          </a:p>
+        </p:txBody>
+      </p:sp>
+      <p:sp>
+        <p:nvSpPr>
+          <p:cNvPr id="160" name="10"/>
+          <p:cNvSpPr txBox="1"/>
+          <p:nvPr/>
+        </p:nvSpPr>
+        <p:spPr>
+          <a:xfrm>
+            <a:off x="10250881" y="8356599"/>
+            <a:ext cx="453238" cy="461060"/>
+          </a:xfrm>
+          <a:prstGeom prst="rect">
+            <a:avLst/>
+          </a:prstGeom>
+          <a:ln w="12700">
+            <a:miter lim="400000"/>
+          </a:ln>
+          <a:extLst>
+            <a:ext uri="{C572A759-6A51-4108-AA02-DFA0A04FC94B}">
+              <ma14:wrappingTextBoxFlag xmlns:ma14="http://schemas.microsoft.com/office/mac/drawingml/2011/main" val="1"/>
+            </a:ext>
+          </a:extLst>
+        </p:spPr>
+        <p:txBody>
+          <a:bodyPr wrap="none" lIns="50800" tIns="50800" rIns="50800" bIns="50800" anchor="ctr">
+            <a:spAutoFit/>
+          </a:bodyPr>
+          <a:lstStyle/>
+          <a:p>
+            <a:pPr/>
+            <a:r>
+              <a:t>10</a:t>
+            </a:r>
+          </a:p>
+        </p:txBody>
+      </p:sp>
     </p:spTree>
   </p:cSld>
   <p:clrMapOvr>
@@ -5223,7 +5297,7 @@
       </p:grpSpPr>
       <p:sp>
         <p:nvSpPr>
-          <p:cNvPr id="160" name="Initial Results…"/>
+          <p:cNvPr id="162" name="Initial Results…"/>
           <p:cNvSpPr txBox="1"/>
           <p:nvPr>
             <p:ph type="title"/>
@@ -5263,7 +5337,7 @@
       </p:sp>
       <p:graphicFrame>
         <p:nvGraphicFramePr>
-          <p:cNvPr id="161" name="Table"/>
+          <p:cNvPr id="163" name="Table"/>
           <p:cNvGraphicFramePr/>
           <p:nvPr/>
         </p:nvGraphicFramePr>
@@ -6213,7 +6287,7 @@
       </p:graphicFrame>
       <p:pic>
         <p:nvPicPr>
-          <p:cNvPr id="162" name="ic-history.png" descr="ic-history.png"/>
+          <p:cNvPr id="164" name="ic-history.png" descr="ic-history.png"/>
           <p:cNvPicPr>
             <a:picLocks noChangeAspect="1"/>
           </p:cNvPicPr>
@@ -6242,7 +6316,7 @@
       </p:pic>
       <p:graphicFrame>
         <p:nvGraphicFramePr>
-          <p:cNvPr id="163" name="Table"/>
+          <p:cNvPr id="165" name="Table"/>
           <p:cNvGraphicFramePr/>
           <p:nvPr/>
         </p:nvGraphicFramePr>
@@ -7192,7 +7266,7 @@
       </p:graphicFrame>
       <p:pic>
         <p:nvPicPr>
-          <p:cNvPr id="164" name="ic-sliding-window.png" descr="ic-sliding-window.png"/>
+          <p:cNvPr id="166" name="ic-sliding-window.png" descr="ic-sliding-window.png"/>
           <p:cNvPicPr>
             <a:picLocks noChangeAspect="1"/>
           </p:cNvPicPr>
@@ -7221,7 +7295,7 @@
       </p:pic>
       <p:pic>
         <p:nvPicPr>
-          <p:cNvPr id="165" name="ic-nonlinear.png" descr="ic-nonlinear.png"/>
+          <p:cNvPr id="167" name="ic-nonlinear.png" descr="ic-nonlinear.png"/>
           <p:cNvPicPr>
             <a:picLocks noChangeAspect="1"/>
           </p:cNvPicPr>
@@ -7248,6 +7322,78 @@
           </a:ln>
         </p:spPr>
       </p:pic>
+      <p:sp>
+        <p:nvSpPr>
+          <p:cNvPr id="168" name="10"/>
+          <p:cNvSpPr txBox="1"/>
+          <p:nvPr/>
+        </p:nvSpPr>
+        <p:spPr>
+          <a:xfrm>
+            <a:off x="3456381" y="8356599"/>
+            <a:ext cx="453238" cy="461060"/>
+          </a:xfrm>
+          <a:prstGeom prst="rect">
+            <a:avLst/>
+          </a:prstGeom>
+          <a:ln w="12700">
+            <a:miter lim="400000"/>
+          </a:ln>
+          <a:extLst>
+            <a:ext uri="{C572A759-6A51-4108-AA02-DFA0A04FC94B}">
+              <ma14:wrappingTextBoxFlag xmlns:ma14="http://schemas.microsoft.com/office/mac/drawingml/2011/main" val="1"/>
+            </a:ext>
+          </a:extLst>
+        </p:spPr>
+        <p:txBody>
+          <a:bodyPr wrap="none" lIns="50800" tIns="50800" rIns="50800" bIns="50800" anchor="ctr">
+            <a:spAutoFit/>
+          </a:bodyPr>
+          <a:lstStyle/>
+          <a:p>
+            <a:pPr/>
+            <a:r>
+              <a:t>10</a:t>
+            </a:r>
+          </a:p>
+        </p:txBody>
+      </p:sp>
+      <p:sp>
+        <p:nvSpPr>
+          <p:cNvPr id="169" name="10"/>
+          <p:cNvSpPr txBox="1"/>
+          <p:nvPr/>
+        </p:nvSpPr>
+        <p:spPr>
+          <a:xfrm>
+            <a:off x="10250881" y="8356599"/>
+            <a:ext cx="453238" cy="461060"/>
+          </a:xfrm>
+          <a:prstGeom prst="rect">
+            <a:avLst/>
+          </a:prstGeom>
+          <a:ln w="12700">
+            <a:miter lim="400000"/>
+          </a:ln>
+          <a:extLst>
+            <a:ext uri="{C572A759-6A51-4108-AA02-DFA0A04FC94B}">
+              <ma14:wrappingTextBoxFlag xmlns:ma14="http://schemas.microsoft.com/office/mac/drawingml/2011/main" val="1"/>
+            </a:ext>
+          </a:extLst>
+        </p:spPr>
+        <p:txBody>
+          <a:bodyPr wrap="none" lIns="50800" tIns="50800" rIns="50800" bIns="50800" anchor="ctr">
+            <a:spAutoFit/>
+          </a:bodyPr>
+          <a:lstStyle/>
+          <a:p>
+            <a:pPr/>
+            <a:r>
+              <a:t>10</a:t>
+            </a:r>
+          </a:p>
+        </p:txBody>
+      </p:sp>
     </p:spTree>
   </p:cSld>
   <p:clrMapOvr>
@@ -7285,7 +7431,7 @@
       </p:grpSpPr>
       <p:sp>
         <p:nvSpPr>
-          <p:cNvPr id="167" name="Window Size Effect…"/>
+          <p:cNvPr id="171" name="Window Size Effect…"/>
           <p:cNvSpPr txBox="1"/>
           <p:nvPr>
             <p:ph type="title"/>
@@ -7325,7 +7471,7 @@
       </p:sp>
       <p:pic>
         <p:nvPicPr>
-          <p:cNvPr id="168" name="ic-nonlinear.png" descr="ic-nonlinear.png"/>
+          <p:cNvPr id="172" name="ic-nonlinear.png" descr="ic-nonlinear.png"/>
           <p:cNvPicPr>
             <a:picLocks noChangeAspect="1"/>
           </p:cNvPicPr>
@@ -7354,7 +7500,7 @@
       </p:pic>
       <p:pic>
         <p:nvPicPr>
-          <p:cNvPr id="169" name="window_accuracy_plot.png" descr="window_accuracy_plot.png"/>
+          <p:cNvPr id="173" name="window_accuracy_plot.png" descr="window_accuracy_plot.png"/>
           <p:cNvPicPr>
             <a:picLocks noChangeAspect="1"/>
           </p:cNvPicPr>
@@ -7383,7 +7529,7 @@
       </p:pic>
       <p:sp>
         <p:nvSpPr>
-          <p:cNvPr id="170" name="accuracy"/>
+          <p:cNvPr id="174" name="accuracy"/>
           <p:cNvSpPr txBox="1"/>
           <p:nvPr/>
         </p:nvSpPr>
@@ -7419,7 +7565,7 @@
       </p:sp>
       <p:sp>
         <p:nvSpPr>
-          <p:cNvPr id="171" name="window size"/>
+          <p:cNvPr id="175" name="window size"/>
           <p:cNvSpPr txBox="1"/>
           <p:nvPr/>
         </p:nvSpPr>
@@ -7490,7 +7636,7 @@
       </p:grpSpPr>
       <p:sp>
         <p:nvSpPr>
-          <p:cNvPr id="173" name="Next Steps"/>
+          <p:cNvPr id="177" name="Next Steps"/>
           <p:cNvSpPr txBox="1"/>
           <p:nvPr>
             <p:ph type="title"/>
@@ -7514,7 +7660,7 @@
       </p:sp>
       <p:sp>
         <p:nvSpPr>
-          <p:cNvPr id="174" name="Increase the accuracy by adding/changing features and fine tuning of the model’s hyper parameters…"/>
+          <p:cNvPr id="178" name="Increase the accuracy by adding / modifying features and fine tuning of the model’s hyper parameters…"/>
           <p:cNvSpPr txBox="1"/>
           <p:nvPr>
             <p:ph type="body" idx="1"/>
@@ -7531,7 +7677,7 @@
           <a:p>
             <a:pPr/>
             <a:r>
-              <a:t>Increase the accuracy by adding/changing features and fine tuning of the model’s hyper parameters</a:t>
+              <a:t>Increase the accuracy by adding / modifying features and fine tuning of the model’s hyper parameters</a:t>
             </a:r>
           </a:p>
           <a:p>
@@ -7549,10 +7695,7 @@
                   </a:schemeClr>
                 </a:solidFill>
               </a:rPr>
-              <a:t>less samples</a:t>
-            </a:r>
-            <a:r>
-              <a:t>.</a:t>
+              <a:t>less time samples</a:t>
             </a:r>
             <a:endParaRPr>
               <a:solidFill>
@@ -7662,7 +7805,7 @@
                                       <p:cBhvr>
                                         <p:cTn id="6" fill="hold"/>
                                         <p:tgtEl>
-                                          <p:spTgt spid="174">
+                                          <p:spTgt spid="178">
                                             <p:bg/>
                                           </p:spTgt>
                                         </p:tgtEl>
@@ -7690,7 +7833,7 @@
                                       <p:cBhvr>
                                         <p:cTn id="8" fill="hold"/>
                                         <p:tgtEl>
-                                          <p:spTgt spid="174">
+                                          <p:spTgt spid="178">
                                             <p:txEl>
                                               <p:pRg st="0" end="0"/>
                                             </p:txEl>
@@ -7738,7 +7881,7 @@
                                       <p:cBhvr>
                                         <p:cTn id="12" fill="hold"/>
                                         <p:tgtEl>
-                                          <p:spTgt spid="174">
+                                          <p:spTgt spid="178">
                                             <p:txEl>
                                               <p:pRg st="1" end="1"/>
                                             </p:txEl>
@@ -7786,7 +7929,7 @@
                                       <p:cBhvr>
                                         <p:cTn id="16" fill="hold"/>
                                         <p:tgtEl>
-                                          <p:spTgt spid="174">
+                                          <p:spTgt spid="178">
                                             <p:txEl>
                                               <p:pRg st="2" end="2"/>
                                             </p:txEl>
@@ -7834,7 +7977,7 @@
                                       <p:cBhvr>
                                         <p:cTn id="20" fill="hold"/>
                                         <p:tgtEl>
-                                          <p:spTgt spid="174">
+                                          <p:spTgt spid="178">
                                             <p:txEl>
                                               <p:pRg st="3" end="3"/>
                                             </p:txEl>
@@ -7879,7 +8022,7 @@
       </p:par>
     </p:tnLst>
     <p:bldLst>
-      <p:bldP build="p" bldLvl="5" animBg="1" rev="0" advAuto="0" spid="174" grpId="1"/>
+      <p:bldP build="p" bldLvl="5" animBg="1" rev="0" advAuto="0" spid="178" grpId="1"/>
     </p:bldLst>
   </p:timing>
 </p:sld>
@@ -7893,7 +8036,9 @@
         <a:blipFill rotWithShape="1">
           <a:blip r:embed="rId2"/>
           <a:srcRect l="0" t="0" r="0" b="0"/>
-          <a:tile tx="0" ty="0" sx="100000" sy="100000" flip="none" algn="tl"/>
+          <a:stretch>
+            <a:fillRect/>
+          </a:stretch>
         </a:blipFill>
       </p:bgPr>
     </p:bg>
@@ -7913,7 +8058,7 @@
       </p:grpSpPr>
       <p:sp>
         <p:nvSpPr>
-          <p:cNvPr id="176" name="Thank You!"/>
+          <p:cNvPr id="180" name="Thank You!"/>
           <p:cNvSpPr txBox="1"/>
           <p:nvPr>
             <p:ph type="title"/>
@@ -7935,40 +8080,6 @@
             <a:pPr/>
             <a:r>
               <a:t>Thank You!</a:t>
-            </a:r>
-          </a:p>
-        </p:txBody>
-      </p:sp>
-      <p:sp>
-        <p:nvSpPr>
-          <p:cNvPr id="177" name="For more information: https://github.com/idocal/workshop/blob/master/MotionSenese/initial-analysis.ipynb"/>
-          <p:cNvSpPr txBox="1"/>
-          <p:nvPr>
-            <p:ph type="body" idx="1"/>
-          </p:nvPr>
-        </p:nvSpPr>
-        <p:spPr>
-          <a:prstGeom prst="rect">
-            <a:avLst/>
-          </a:prstGeom>
-        </p:spPr>
-        <p:txBody>
-          <a:bodyPr anchor="b"/>
-          <a:lstStyle/>
-          <a:p>
-            <a:pPr/>
-            <a:r>
-              <a:t>For more information:</a:t>
-            </a:r>
-            <a:br/>
-            <a:r>
-              <a:rPr u="sng">
-                <a:solidFill>
-                  <a:srgbClr val="A9A9A9"/>
-                </a:solidFill>
-                <a:hlinkClick r:id="rId3" invalidUrl="" action="" tgtFrame="" tooltip="" history="1" highlightClick="0" endSnd="0"/>
-              </a:rPr>
-              <a:t>https://github.com/idocal/workshop/blob/master/MotionSenese/initial-analysis.ipynb</a:t>
             </a:r>
           </a:p>
         </p:txBody>
@@ -9838,12 +9949,12 @@
       </p:par>
     </p:tnLst>
     <p:bldLst>
+      <p:bldP build="whole" bldLvl="1" animBg="1" rev="0" advAuto="0" spid="142" grpId="2"/>
+      <p:bldP build="p" bldLvl="5" animBg="1" rev="0" advAuto="0" spid="138" grpId="1"/>
+      <p:bldP build="whole" bldLvl="1" animBg="1" rev="0" advAuto="0" spid="143" grpId="5"/>
       <p:bldP build="whole" bldLvl="1" animBg="1" rev="0" advAuto="0" spid="139" grpId="3"/>
       <p:bldP build="whole" bldLvl="1" animBg="1" rev="0" advAuto="0" spid="141" grpId="4"/>
       <p:bldP build="whole" bldLvl="1" animBg="1" rev="0" advAuto="0" spid="140" grpId="6"/>
-      <p:bldP build="p" bldLvl="5" animBg="1" rev="0" advAuto="0" spid="138" grpId="1"/>
-      <p:bldP build="whole" bldLvl="1" animBg="1" rev="0" advAuto="0" spid="142" grpId="2"/>
-      <p:bldP build="whole" bldLvl="1" animBg="1" rev="0" advAuto="0" spid="143" grpId="5"/>
     </p:bldLst>
   </p:timing>
 </p:sld>
@@ -9936,7 +10047,7 @@
               <a:defRPr sz="2560"/>
             </a:pPr>
             <a:r>
-              <a:t>How long should the window be?</a:t>
+              <a:t>How long should the window / history be?</a:t>
             </a:r>
           </a:p>
           <a:p>
@@ -10648,6 +10759,48 @@
           <a:p>
             <a:pPr/>
             <a:r>
+              <a:t>Results over </a:t>
+            </a:r>
+            <a:r>
+              <a:rPr>
+                <a:solidFill>
+                  <a:schemeClr val="accent4">
+                    <a:hueOff val="468000"/>
+                    <a:satOff val="-4761"/>
+                    <a:lumOff val="10196"/>
+                  </a:schemeClr>
+                </a:solidFill>
+              </a:rPr>
+              <a:t>10</a:t>
+            </a:r>
+            <a:r>
+              <a:t> sized window / history ~ </a:t>
+            </a:r>
+            <a:r>
+              <a:rPr>
+                <a:solidFill>
+                  <a:schemeClr val="accent4">
+                    <a:hueOff val="468000"/>
+                    <a:satOff val="-4761"/>
+                    <a:lumOff val="10196"/>
+                  </a:schemeClr>
+                </a:solidFill>
+              </a:rPr>
+              <a:t>1sec</a:t>
+            </a:r>
+            <a:endParaRPr>
+              <a:solidFill>
+                <a:schemeClr val="accent4">
+                  <a:hueOff val="468000"/>
+                  <a:satOff val="-4761"/>
+                  <a:lumOff val="10196"/>
+                </a:schemeClr>
+              </a:solidFill>
+            </a:endParaRPr>
+          </a:p>
+          <a:p>
+            <a:pPr/>
+            <a:r>
               <a:t>Logistic Regression did not achieve good results on validation set</a:t>
             </a:r>
           </a:p>
@@ -10683,7 +10836,7 @@
         </p:blipFill>
         <p:spPr>
           <a:xfrm>
-            <a:off x="1727844" y="2676673"/>
+            <a:off x="1727844" y="2168673"/>
             <a:ext cx="812801" cy="812801"/>
           </a:xfrm>
           <a:prstGeom prst="rect">
@@ -10712,7 +10865,7 @@
         </p:blipFill>
         <p:spPr>
           <a:xfrm>
-            <a:off x="3782814" y="2676673"/>
+            <a:off x="3782814" y="2168673"/>
             <a:ext cx="812801" cy="812801"/>
           </a:xfrm>
           <a:prstGeom prst="rect">
@@ -11027,6 +11180,54 @@
                       </p:childTnLst>
                     </p:cTn>
                   </p:par>
+                  <p:par>
+                    <p:cTn id="27" fill="hold">
+                      <p:stCondLst>
+                        <p:cond delay="indefinite"/>
+                      </p:stCondLst>
+                      <p:childTnLst>
+                        <p:par>
+                          <p:cTn id="28" fill="hold">
+                            <p:stCondLst>
+                              <p:cond delay="0"/>
+                            </p:stCondLst>
+                            <p:childTnLst>
+                              <p:par>
+                                <p:cTn id="29" presetClass="entr" nodeType="clickEffect" presetSubtype="0" presetID="1" grpId="1" fill="hold">
+                                  <p:stCondLst>
+                                    <p:cond delay="0"/>
+                                  </p:stCondLst>
+                                  <p:iterate type="el" backwards="0">
+                                    <p:tmAbs val="0"/>
+                                  </p:iterate>
+                                  <p:childTnLst>
+                                    <p:set>
+                                      <p:cBhvr>
+                                        <p:cTn id="30" fill="hold"/>
+                                        <p:tgtEl>
+                                          <p:spTgt spid="149">
+                                            <p:txEl>
+                                              <p:pRg st="4" end="4"/>
+                                            </p:txEl>
+                                          </p:spTgt>
+                                        </p:tgtEl>
+                                        <p:attrNameLst>
+                                          <p:attrName>style.visibility</p:attrName>
+                                        </p:attrNameLst>
+                                      </p:cBhvr>
+                                      <p:to>
+                                        <p:strVal val="visible"/>
+                                      </p:to>
+                                    </p:set>
+                                  </p:childTnLst>
+                                </p:cTn>
+                              </p:par>
+                            </p:childTnLst>
+                          </p:cTn>
+                        </p:par>
+                      </p:childTnLst>
+                    </p:cTn>
+                  </p:par>
                 </p:childTnLst>
               </p:cTn>
               <p:prevCondLst>
@@ -11049,9 +11250,9 @@
       </p:par>
     </p:tnLst>
     <p:bldLst>
+      <p:bldP build="whole" bldLvl="1" animBg="1" rev="0" advAuto="0" spid="150" grpId="2"/>
+      <p:bldP build="p" bldLvl="5" animBg="1" rev="0" advAuto="0" spid="149" grpId="1"/>
       <p:bldP build="whole" bldLvl="1" animBg="1" rev="0" advAuto="0" spid="151" grpId="3"/>
-      <p:bldP build="p" bldLvl="5" animBg="1" rev="0" advAuto="0" spid="149" grpId="1"/>
-      <p:bldP build="whole" bldLvl="1" animBg="1" rev="0" advAuto="0" spid="150" grpId="2"/>
     </p:bldLst>
   </p:timing>
 </p:sld>

</xml_diff>